<commit_message>
add the presentation of project to master
</commit_message>
<xml_diff>
--- a/docs/Crypto-Storage.pptx
+++ b/docs/Crypto-Storage.pptx
@@ -285,7 +285,7 @@
           <a:p>
             <a:fld id="{48A87A34-81AB-432B-8DAE-1953F412C126}" type="datetimeFigureOut">
               <a:rPr lang="en-US" dirty="0"/>
-              <a:t>12/8/2015</a:t>
+              <a:t>12/9/15</a:t>
             </a:fld>
             <a:endParaRPr lang="en-US" dirty="0"/>
           </a:p>
@@ -547,7 +547,7 @@
           <a:p>
             <a:fld id="{48A87A34-81AB-432B-8DAE-1953F412C126}" type="datetimeFigureOut">
               <a:rPr lang="en-US" dirty="0"/>
-              <a:t>12/8/2015</a:t>
+              <a:t>12/9/15</a:t>
             </a:fld>
             <a:endParaRPr lang="en-US" dirty="0"/>
           </a:p>
@@ -774,7 +774,7 @@
             <a:fld id="{48A87A34-81AB-432B-8DAE-1953F412C126}" type="datetimeFigureOut">
               <a:rPr lang="en-US" dirty="0"/>
               <a:pPr/>
-              <a:t>12/8/2015</a:t>
+              <a:t>12/9/15</a:t>
             </a:fld>
             <a:endParaRPr lang="en-US" dirty="0"/>
           </a:p>
@@ -1080,7 +1080,7 @@
             <a:fld id="{48A87A34-81AB-432B-8DAE-1953F412C126}" type="datetimeFigureOut">
               <a:rPr lang="en-US" dirty="0"/>
               <a:pPr/>
-              <a:t>12/8/2015</a:t>
+              <a:t>12/9/15</a:t>
             </a:fld>
             <a:endParaRPr lang="en-US" dirty="0"/>
           </a:p>
@@ -1549,7 +1549,7 @@
             <a:fld id="{48A87A34-81AB-432B-8DAE-1953F412C126}" type="datetimeFigureOut">
               <a:rPr lang="en-US" dirty="0"/>
               <a:pPr/>
-              <a:t>12/8/2015</a:t>
+              <a:t>12/9/15</a:t>
             </a:fld>
             <a:endParaRPr lang="en-US" dirty="0"/>
           </a:p>
@@ -2091,7 +2091,7 @@
           <a:p>
             <a:fld id="{48A87A34-81AB-432B-8DAE-1953F412C126}" type="datetimeFigureOut">
               <a:rPr lang="en-US" dirty="0"/>
-              <a:t>12/8/2015</a:t>
+              <a:t>12/9/15</a:t>
             </a:fld>
             <a:endParaRPr lang="en-US" dirty="0"/>
           </a:p>
@@ -2860,7 +2860,7 @@
           <a:p>
             <a:fld id="{48A87A34-81AB-432B-8DAE-1953F412C126}" type="datetimeFigureOut">
               <a:rPr lang="en-US" dirty="0"/>
-              <a:t>12/8/2015</a:t>
+              <a:t>12/9/15</a:t>
             </a:fld>
             <a:endParaRPr lang="en-US" dirty="0"/>
           </a:p>
@@ -3030,7 +3030,7 @@
           <a:p>
             <a:fld id="{48A87A34-81AB-432B-8DAE-1953F412C126}" type="datetimeFigureOut">
               <a:rPr lang="en-US" dirty="0"/>
-              <a:t>12/8/2015</a:t>
+              <a:t>12/9/15</a:t>
             </a:fld>
             <a:endParaRPr lang="en-US" dirty="0"/>
           </a:p>
@@ -3249,7 +3249,7 @@
             <a:fld id="{48A87A34-81AB-432B-8DAE-1953F412C126}" type="datetimeFigureOut">
               <a:rPr lang="en-US" dirty="0"/>
               <a:pPr/>
-              <a:t>12/8/2015</a:t>
+              <a:t>12/9/15</a:t>
             </a:fld>
             <a:endParaRPr lang="en-US" dirty="0"/>
           </a:p>
@@ -3424,7 +3424,7 @@
           <a:p>
             <a:fld id="{48A87A34-81AB-432B-8DAE-1953F412C126}" type="datetimeFigureOut">
               <a:rPr lang="en-US" dirty="0"/>
-              <a:t>12/8/2015</a:t>
+              <a:t>12/9/15</a:t>
             </a:fld>
             <a:endParaRPr lang="en-US" dirty="0"/>
           </a:p>
@@ -3709,7 +3709,7 @@
             <a:fld id="{48A87A34-81AB-432B-8DAE-1953F412C126}" type="datetimeFigureOut">
               <a:rPr lang="en-US" dirty="0"/>
               <a:pPr/>
-              <a:t>12/8/2015</a:t>
+              <a:t>12/9/15</a:t>
             </a:fld>
             <a:endParaRPr lang="en-US" dirty="0"/>
           </a:p>
@@ -3946,7 +3946,7 @@
           <a:p>
             <a:fld id="{48A87A34-81AB-432B-8DAE-1953F412C126}" type="datetimeFigureOut">
               <a:rPr lang="en-US" dirty="0"/>
-              <a:t>12/8/2015</a:t>
+              <a:t>12/9/15</a:t>
             </a:fld>
             <a:endParaRPr lang="en-US" dirty="0"/>
           </a:p>
@@ -4320,7 +4320,7 @@
           <a:p>
             <a:fld id="{48A87A34-81AB-432B-8DAE-1953F412C126}" type="datetimeFigureOut">
               <a:rPr lang="en-US" dirty="0"/>
-              <a:t>12/8/2015</a:t>
+              <a:t>12/9/15</a:t>
             </a:fld>
             <a:endParaRPr lang="en-US" dirty="0"/>
           </a:p>
@@ -4433,7 +4433,7 @@
           <a:p>
             <a:fld id="{48A87A34-81AB-432B-8DAE-1953F412C126}" type="datetimeFigureOut">
               <a:rPr lang="en-US" dirty="0"/>
-              <a:t>12/8/2015</a:t>
+              <a:t>12/9/15</a:t>
             </a:fld>
             <a:endParaRPr lang="en-US" dirty="0"/>
           </a:p>
@@ -4523,7 +4523,7 @@
           <a:p>
             <a:fld id="{48A87A34-81AB-432B-8DAE-1953F412C126}" type="datetimeFigureOut">
               <a:rPr lang="en-US" dirty="0"/>
-              <a:t>12/8/2015</a:t>
+              <a:t>12/9/15</a:t>
             </a:fld>
             <a:endParaRPr lang="en-US" dirty="0"/>
           </a:p>
@@ -4767,7 +4767,7 @@
           <a:p>
             <a:fld id="{48A87A34-81AB-432B-8DAE-1953F412C126}" type="datetimeFigureOut">
               <a:rPr lang="en-US" dirty="0"/>
-              <a:t>12/8/2015</a:t>
+              <a:t>12/9/15</a:t>
             </a:fld>
             <a:endParaRPr lang="en-US" dirty="0"/>
           </a:p>
@@ -5019,7 +5019,7 @@
           <a:p>
             <a:fld id="{48A87A34-81AB-432B-8DAE-1953F412C126}" type="datetimeFigureOut">
               <a:rPr lang="en-US" dirty="0"/>
-              <a:t>12/8/2015</a:t>
+              <a:t>12/9/15</a:t>
             </a:fld>
             <a:endParaRPr lang="en-US" dirty="0"/>
           </a:p>
@@ -5258,7 +5258,7 @@
             <a:fld id="{48A87A34-81AB-432B-8DAE-1953F412C126}" type="datetimeFigureOut">
               <a:rPr lang="en-US" dirty="0"/>
               <a:pPr/>
-              <a:t>12/8/2015</a:t>
+              <a:t>12/9/15</a:t>
             </a:fld>
             <a:endParaRPr lang="en-US" dirty="0"/>
           </a:p>
@@ -5732,7 +5732,7 @@
   <p:timing>
     <p:tnLst>
       <p:par>
-        <p:cTn id="1" dur="indefinite" restart="never" nodeType="tmRoot"/>
+        <p:cTn xmlns:p14="http://schemas.microsoft.com/office/powerpoint/2010/main" id="1" dur="indefinite" restart="never" nodeType="tmRoot"/>
       </p:par>
     </p:tnLst>
   </p:timing>
@@ -5836,6 +5836,13 @@
   <p:clrMapOvr>
     <a:masterClrMapping/>
   </p:clrMapOvr>
+  <p:timing>
+    <p:tnLst>
+      <p:par>
+        <p:cTn xmlns:p14="http://schemas.microsoft.com/office/powerpoint/2010/main" id="1" dur="indefinite" restart="never" nodeType="tmRoot"/>
+      </p:par>
+    </p:tnLst>
+  </p:timing>
 </p:sld>
 </file>
 
@@ -5938,6 +5945,13 @@
   <p:clrMapOvr>
     <a:masterClrMapping/>
   </p:clrMapOvr>
+  <p:timing>
+    <p:tnLst>
+      <p:par>
+        <p:cTn xmlns:p14="http://schemas.microsoft.com/office/powerpoint/2010/main" id="1" dur="indefinite" restart="never" nodeType="tmRoot"/>
+      </p:par>
+    </p:tnLst>
+  </p:timing>
 </p:sld>
 </file>
 
@@ -5981,15 +5995,32 @@
           </a:p>
         </p:txBody>
       </p:sp>
+      <p:sp>
+        <p:nvSpPr>
+          <p:cNvPr id="5" name="Content Placeholder 4"/>
+          <p:cNvSpPr>
+            <a:spLocks noGrp="1"/>
+          </p:cNvSpPr>
+          <p:nvPr>
+            <p:ph idx="1"/>
+          </p:nvPr>
+        </p:nvSpPr>
+        <p:spPr/>
+        <p:txBody>
+          <a:bodyPr/>
+          <a:lstStyle/>
+          <a:p>
+            <a:endParaRPr lang="en-US"/>
+          </a:p>
+        </p:txBody>
+      </p:sp>
       <p:pic>
         <p:nvPicPr>
-          <p:cNvPr id="4" name="Content Placeholder 3"/>
+          <p:cNvPr id="6" name="Picture 5"/>
           <p:cNvPicPr>
-            <a:picLocks noGrp="1" noChangeAspect="1"/>
+            <a:picLocks noChangeAspect="1"/>
           </p:cNvPicPr>
-          <p:nvPr>
-            <p:ph idx="1"/>
-          </p:nvPr>
+          <p:nvPr/>
         </p:nvPicPr>
         <p:blipFill>
           <a:blip r:embed="rId2"/>
@@ -5999,8 +6030,8 @@
         </p:blipFill>
         <p:spPr>
           <a:xfrm>
-            <a:off x="2158313" y="2226875"/>
-            <a:ext cx="9168714" cy="4024313"/>
+            <a:off x="776287" y="2057401"/>
+            <a:ext cx="10639425" cy="4729161"/>
           </a:xfrm>
           <a:prstGeom prst="rect">
             <a:avLst/>
@@ -6017,6 +6048,13 @@
   <p:clrMapOvr>
     <a:masterClrMapping/>
   </p:clrMapOvr>
+  <p:timing>
+    <p:tnLst>
+      <p:par>
+        <p:cTn xmlns:p14="http://schemas.microsoft.com/office/powerpoint/2010/main" id="1" dur="indefinite" restart="never" nodeType="tmRoot"/>
+      </p:par>
+    </p:tnLst>
+  </p:timing>
 </p:sld>
 </file>
 
@@ -6130,6 +6168,13 @@
   <p:clrMapOvr>
     <a:masterClrMapping/>
   </p:clrMapOvr>
+  <p:timing>
+    <p:tnLst>
+      <p:par>
+        <p:cTn xmlns:p14="http://schemas.microsoft.com/office/powerpoint/2010/main" id="1" dur="indefinite" restart="never" nodeType="tmRoot"/>
+      </p:par>
+    </p:tnLst>
+  </p:timing>
 </p:sld>
 </file>
 
@@ -6209,6 +6254,13 @@
   <p:clrMapOvr>
     <a:masterClrMapping/>
   </p:clrMapOvr>
+  <p:timing>
+    <p:tnLst>
+      <p:par>
+        <p:cTn xmlns:p14="http://schemas.microsoft.com/office/powerpoint/2010/main" id="1" dur="indefinite" restart="never" nodeType="tmRoot"/>
+      </p:par>
+    </p:tnLst>
+  </p:timing>
 </p:sld>
 </file>
 
@@ -6324,6 +6376,13 @@
   <p:clrMapOvr>
     <a:masterClrMapping/>
   </p:clrMapOvr>
+  <p:timing>
+    <p:tnLst>
+      <p:par>
+        <p:cTn xmlns:p14="http://schemas.microsoft.com/office/powerpoint/2010/main" id="1" dur="indefinite" restart="never" nodeType="tmRoot"/>
+      </p:par>
+    </p:tnLst>
+  </p:timing>
 </p:sld>
 </file>
 
@@ -6396,6 +6455,13 @@
   <p:clrMapOvr>
     <a:masterClrMapping/>
   </p:clrMapOvr>
+  <p:timing>
+    <p:tnLst>
+      <p:par>
+        <p:cTn xmlns:p14="http://schemas.microsoft.com/office/powerpoint/2010/main" id="1" dur="indefinite" restart="never" nodeType="tmRoot"/>
+      </p:par>
+    </p:tnLst>
+  </p:timing>
 </p:sld>
 </file>
 
@@ -6456,19 +6522,46 @@
           <a:p>
             <a:r>
               <a:rPr lang="en-US" dirty="0" smtClean="0"/>
+              <a:t>Teamwork, we know each other more.</a:t>
+            </a:r>
+          </a:p>
+          <a:p>
+            <a:r>
+              <a:rPr lang="en-US" dirty="0" smtClean="0"/>
               <a:t>The web application fulfill all important security expects.</a:t>
             </a:r>
           </a:p>
           <a:p>
             <a:r>
               <a:rPr lang="en-US" dirty="0" smtClean="0"/>
-              <a:t>We will enhance the product so I will support all different file format. </a:t>
-            </a:r>
-          </a:p>
-          <a:p>
+              <a:t>We will enhance </a:t>
+            </a:r>
+            <a:r>
+              <a:rPr lang="en-US" smtClean="0"/>
+              <a:t>the </a:t>
+            </a:r>
+            <a:r>
+              <a:rPr lang="en-US" smtClean="0"/>
+              <a:t>app so </a:t>
+            </a:r>
             <a:r>
               <a:rPr lang="en-US" dirty="0" smtClean="0"/>
-              <a:t>Building a server to host the web app.</a:t>
+              <a:t>I will support all different </a:t>
+            </a:r>
+            <a:r>
+              <a:rPr lang="en-US" smtClean="0"/>
+              <a:t>file </a:t>
+            </a:r>
+            <a:r>
+              <a:rPr lang="en-US" smtClean="0"/>
+              <a:t>formats. </a:t>
+            </a:r>
+            <a:endParaRPr lang="en-US" dirty="0" smtClean="0"/>
+          </a:p>
+          <a:p>
+            <a:r>
+              <a:rPr lang="en-US" dirty="0" smtClean="0"/>
+              <a:t>Building a dedicate server to host the web app.</a:t>
             </a:r>
           </a:p>
           <a:p>
@@ -6486,6 +6579,13 @@
   <p:clrMapOvr>
     <a:masterClrMapping/>
   </p:clrMapOvr>
+  <p:timing>
+    <p:tnLst>
+      <p:par>
+        <p:cTn xmlns:p14="http://schemas.microsoft.com/office/powerpoint/2010/main" id="1" dur="indefinite" restart="never" nodeType="tmRoot"/>
+      </p:par>
+    </p:tnLst>
+  </p:timing>
 </p:sld>
 </file>
 
@@ -6532,7 +6632,7 @@
     </a:clrScheme>
     <a:fontScheme name="Vapor Trail">
       <a:majorFont>
-        <a:latin typeface="Century Gothic" panose="020B0502020202020204"/>
+        <a:latin typeface="Century Gothic"/>
         <a:ea typeface=""/>
         <a:cs typeface=""/>
         <a:font script="Jpan" typeface="ＭＳ Ｐゴシック"/>
@@ -6567,7 +6667,7 @@
         <a:font script="Geor" typeface="Sylfaen"/>
       </a:majorFont>
       <a:minorFont>
-        <a:latin typeface="Century Gothic" panose="020B0502020202020204"/>
+        <a:latin typeface="Century Gothic"/>
         <a:ea typeface=""/>
         <a:cs typeface=""/>
         <a:font script="Jpan" typeface="ＭＳ Ｐゴシック"/>
@@ -6753,7 +6853,7 @@
   <a:extraClrSchemeLst/>
   <a:extLst>
     <a:ext uri="{05A4C25C-085E-4340-85A3-A5531E510DB2}">
-      <thm15:themeFamily xmlns:thm15="http://schemas.microsoft.com/office/thememl/2012/main" name="Vapor Trail" id="{4FDF2955-7D9C-493C-B9F9-C205151B46CD}" vid="{8F31A783-2159-4870-BC29-2BA7D038EA44}"/>
+      <thm15:themeFamily xmlns:thm15="http://schemas.microsoft.com/office/thememl/2012/main" xmlns="" name="Vapor Trail" id="{4FDF2955-7D9C-493C-B9F9-C205151B46CD}" vid="{8F31A783-2159-4870-BC29-2BA7D038EA44}"/>
     </a:ext>
   </a:extLst>
 </a:theme>

</xml_diff>